<commit_message>
esqueleto y nueva imagen
</commit_message>
<xml_diff>
--- a/2023-2/Reportes/ReporteFinal/PresentacionPrototipo.pptx
+++ b/2023-2/Reportes/ReporteFinal/PresentacionPrototipo.pptx
@@ -521,7 +521,7 @@
           <a:p>
             <a:fld id="{89D7F374-E7E0-4B8D-9A42-55415141E493}" type="datetimeFigureOut">
               <a:rPr lang="es-MX" smtClean="0"/>
-              <a:t>06/06/2023</a:t>
+              <a:t>07/06/2023</a:t>
             </a:fld>
             <a:endParaRPr lang="es-MX"/>
           </a:p>
@@ -721,7 +721,7 @@
           <a:p>
             <a:fld id="{89D7F374-E7E0-4B8D-9A42-55415141E493}" type="datetimeFigureOut">
               <a:rPr lang="es-MX" smtClean="0"/>
-              <a:t>06/06/2023</a:t>
+              <a:t>07/06/2023</a:t>
             </a:fld>
             <a:endParaRPr lang="es-MX"/>
           </a:p>
@@ -931,7 +931,7 @@
           <a:p>
             <a:fld id="{89D7F374-E7E0-4B8D-9A42-55415141E493}" type="datetimeFigureOut">
               <a:rPr lang="es-MX" smtClean="0"/>
-              <a:t>06/06/2023</a:t>
+              <a:t>07/06/2023</a:t>
             </a:fld>
             <a:endParaRPr lang="es-MX"/>
           </a:p>
@@ -1131,7 +1131,7 @@
           <a:p>
             <a:fld id="{89D7F374-E7E0-4B8D-9A42-55415141E493}" type="datetimeFigureOut">
               <a:rPr lang="es-MX" smtClean="0"/>
-              <a:t>06/06/2023</a:t>
+              <a:t>07/06/2023</a:t>
             </a:fld>
             <a:endParaRPr lang="es-MX"/>
           </a:p>
@@ -1407,7 +1407,7 @@
           <a:p>
             <a:fld id="{89D7F374-E7E0-4B8D-9A42-55415141E493}" type="datetimeFigureOut">
               <a:rPr lang="es-MX" smtClean="0"/>
-              <a:t>06/06/2023</a:t>
+              <a:t>07/06/2023</a:t>
             </a:fld>
             <a:endParaRPr lang="es-MX"/>
           </a:p>
@@ -1675,7 +1675,7 @@
           <a:p>
             <a:fld id="{89D7F374-E7E0-4B8D-9A42-55415141E493}" type="datetimeFigureOut">
               <a:rPr lang="es-MX" smtClean="0"/>
-              <a:t>06/06/2023</a:t>
+              <a:t>07/06/2023</a:t>
             </a:fld>
             <a:endParaRPr lang="es-MX"/>
           </a:p>
@@ -2090,7 +2090,7 @@
           <a:p>
             <a:fld id="{89D7F374-E7E0-4B8D-9A42-55415141E493}" type="datetimeFigureOut">
               <a:rPr lang="es-MX" smtClean="0"/>
-              <a:t>06/06/2023</a:t>
+              <a:t>07/06/2023</a:t>
             </a:fld>
             <a:endParaRPr lang="es-MX"/>
           </a:p>
@@ -2232,7 +2232,7 @@
           <a:p>
             <a:fld id="{89D7F374-E7E0-4B8D-9A42-55415141E493}" type="datetimeFigureOut">
               <a:rPr lang="es-MX" smtClean="0"/>
-              <a:t>06/06/2023</a:t>
+              <a:t>07/06/2023</a:t>
             </a:fld>
             <a:endParaRPr lang="es-MX"/>
           </a:p>
@@ -2345,7 +2345,7 @@
           <a:p>
             <a:fld id="{89D7F374-E7E0-4B8D-9A42-55415141E493}" type="datetimeFigureOut">
               <a:rPr lang="es-MX" smtClean="0"/>
-              <a:t>06/06/2023</a:t>
+              <a:t>07/06/2023</a:t>
             </a:fld>
             <a:endParaRPr lang="es-MX"/>
           </a:p>
@@ -2658,7 +2658,7 @@
           <a:p>
             <a:fld id="{89D7F374-E7E0-4B8D-9A42-55415141E493}" type="datetimeFigureOut">
               <a:rPr lang="es-MX" smtClean="0"/>
-              <a:t>06/06/2023</a:t>
+              <a:t>07/06/2023</a:t>
             </a:fld>
             <a:endParaRPr lang="es-MX"/>
           </a:p>
@@ -2947,7 +2947,7 @@
           <a:p>
             <a:fld id="{89D7F374-E7E0-4B8D-9A42-55415141E493}" type="datetimeFigureOut">
               <a:rPr lang="es-MX" smtClean="0"/>
-              <a:t>06/06/2023</a:t>
+              <a:t>07/06/2023</a:t>
             </a:fld>
             <a:endParaRPr lang="es-MX"/>
           </a:p>
@@ -3190,7 +3190,7 @@
           <a:p>
             <a:fld id="{89D7F374-E7E0-4B8D-9A42-55415141E493}" type="datetimeFigureOut">
               <a:rPr lang="es-MX" smtClean="0"/>
-              <a:t>06/06/2023</a:t>
+              <a:t>07/06/2023</a:t>
             </a:fld>
             <a:endParaRPr lang="es-MX"/>
           </a:p>
@@ -3767,6 +3767,14 @@
 <file path=ppt/slides/slide3.xml><?xml version="1.0" encoding="utf-8"?>
 <p:sld xmlns:a="http://schemas.openxmlformats.org/drawingml/2006/main" xmlns:r="http://schemas.openxmlformats.org/officeDocument/2006/relationships" xmlns:p="http://schemas.openxmlformats.org/presentationml/2006/main">
   <p:cSld>
+    <p:bg>
+      <p:bgPr>
+        <a:solidFill>
+          <a:schemeClr val="bg1"/>
+        </a:solidFill>
+        <a:effectLst/>
+      </p:bgPr>
+    </p:bg>
     <p:spTree>
       <p:nvGrpSpPr>
         <p:cNvPr id="1" name=""/>
@@ -3783,6 +3791,69 @@
       </p:grpSpPr>
       <p:sp>
         <p:nvSpPr>
+          <p:cNvPr id="16" name="Flowchart: Document 15">
+            <a:extLst>
+              <a:ext uri="{FF2B5EF4-FFF2-40B4-BE49-F238E27FC236}">
+                <a16:creationId xmlns:a16="http://schemas.microsoft.com/office/drawing/2014/main" id="{D12DDE76-C203-4047-9998-63900085B5E8}"/>
+              </a:ext>
+              <a:ext uri="{C183D7F6-B498-43B3-948B-1728B52AA6E4}">
+                <adec:decorative xmlns:adec="http://schemas.microsoft.com/office/drawing/2017/decorative" val="1"/>
+              </a:ext>
+            </a:extLst>
+          </p:cNvPr>
+          <p:cNvSpPr>
+            <a:spLocks noGrp="1" noRot="1" noChangeAspect="1" noMove="1" noResize="1" noEditPoints="1" noAdjustHandles="1" noChangeArrowheads="1" noChangeShapeType="1" noTextEdit="1"/>
+          </p:cNvSpPr>
+          <p:nvPr>
+            <p:extLst>
+              <p:ext uri="{386F3935-93C4-4BCD-93E2-E3B085C9AB24}">
+                <p16:designElem xmlns:p16="http://schemas.microsoft.com/office/powerpoint/2015/main" val="1"/>
+              </p:ext>
+            </p:extLst>
+          </p:nvPr>
+        </p:nvSpPr>
+        <p:spPr>
+          <a:xfrm>
+            <a:off x="638175" y="0"/>
+            <a:ext cx="3248025" cy="3400426"/>
+          </a:xfrm>
+          <a:prstGeom prst="flowChartDocument">
+            <a:avLst/>
+          </a:prstGeom>
+          <a:solidFill>
+            <a:srgbClr val="56533B"/>
+          </a:solidFill>
+          <a:ln>
+            <a:noFill/>
+          </a:ln>
+        </p:spPr>
+        <p:style>
+          <a:lnRef idx="2">
+            <a:schemeClr val="accent1">
+              <a:shade val="50000"/>
+            </a:schemeClr>
+          </a:lnRef>
+          <a:fillRef idx="1">
+            <a:schemeClr val="accent1"/>
+          </a:fillRef>
+          <a:effectRef idx="0">
+            <a:schemeClr val="accent1"/>
+          </a:effectRef>
+          <a:fontRef idx="minor">
+            <a:schemeClr val="lt1"/>
+          </a:fontRef>
+        </p:style>
+        <p:txBody>
+          <a:bodyPr rtlCol="0" anchor="ctr"/>
+          <a:lstStyle/>
+          <a:p>
+            <a:pPr algn="ctr"/>
+            <a:endParaRPr lang="en-US"/>
+          </a:p>
+        </p:txBody>
+      </p:sp>
+      <p:sp>
+        <p:nvSpPr>
           <p:cNvPr id="2" name="Título 1">
             <a:extLst>
               <a:ext uri="{FF2B5EF4-FFF2-40B4-BE49-F238E27FC236}">
@@ -3797,66 +3868,47 @@
             <p:ph type="title"/>
           </p:nvPr>
         </p:nvSpPr>
-        <p:spPr/>
-        <p:txBody>
-          <a:bodyPr/>
-          <a:lstStyle/>
-          <a:p>
-            <a:pPr algn="ctr"/>
-            <a:r>
-              <a:rPr lang="es-ES" dirty="0"/>
-              <a:t>Cadena de </a:t>
-            </a:r>
-            <a:r>
-              <a:rPr lang="es-ES" dirty="0" err="1"/>
-              <a:t>Markov</a:t>
-            </a:r>
-            <a:r>
-              <a:rPr lang="es-ES" dirty="0"/>
-              <a:t> para servicios de video en vivo (Modelo)</a:t>
-            </a:r>
-            <a:endParaRPr lang="es-MX" dirty="0"/>
-          </a:p>
-        </p:txBody>
-      </p:sp>
-      <p:sp>
-        <p:nvSpPr>
-          <p:cNvPr id="3" name="Marcador de contenido 2">
-            <a:extLst>
-              <a:ext uri="{FF2B5EF4-FFF2-40B4-BE49-F238E27FC236}">
-                <a16:creationId xmlns:a16="http://schemas.microsoft.com/office/drawing/2014/main" id="{F71E97B8-C28F-4CFD-E306-FFA1831B1EC3}"/>
-              </a:ext>
-            </a:extLst>
-          </p:cNvPr>
-          <p:cNvSpPr>
-            <a:spLocks noGrp="1"/>
-          </p:cNvSpPr>
-          <p:nvPr>
-            <p:ph idx="1"/>
-          </p:nvPr>
-        </p:nvSpPr>
-        <p:spPr/>
-        <p:txBody>
-          <a:bodyPr/>
-          <a:lstStyle/>
-          <a:p>
-            <a:endParaRPr lang="es-MX"/>
+        <p:spPr>
+          <a:xfrm>
+            <a:off x="838200" y="171162"/>
+            <a:ext cx="2840182" cy="2371148"/>
+          </a:xfrm>
+        </p:spPr>
+        <p:txBody>
+          <a:bodyPr vert="horz" lIns="91440" tIns="45720" rIns="91440" bIns="45720" rtlCol="0" anchor="ctr">
+            <a:normAutofit/>
+          </a:bodyPr>
+          <a:lstStyle/>
+          <a:p>
+            <a:r>
+              <a:rPr lang="en-US" sz="3200" kern="1200">
+                <a:solidFill>
+                  <a:srgbClr val="FFFFFF"/>
+                </a:solidFill>
+                <a:latin typeface="+mj-lt"/>
+                <a:ea typeface="+mj-ea"/>
+                <a:cs typeface="+mj-cs"/>
+              </a:rPr>
+              <a:t>Cadena de Markov para servicios de video en vivo (Modelo)</a:t>
+            </a:r>
           </a:p>
         </p:txBody>
       </p:sp>
       <p:pic>
         <p:nvPicPr>
-          <p:cNvPr id="4" name="Imagen 52" descr="Diagrama&#10;&#10;Descripción generada automáticamente">
-            <a:extLst>
-              <a:ext uri="{FF2B5EF4-FFF2-40B4-BE49-F238E27FC236}">
-                <a16:creationId xmlns:a16="http://schemas.microsoft.com/office/drawing/2014/main" id="{B6DC8511-0BFC-3E58-9B68-C06C6CA8156A}"/>
+          <p:cNvPr id="11" name="Marcador de contenido 10" descr="Diagrama&#10;&#10;Descripción generada automáticamente">
+            <a:extLst>
+              <a:ext uri="{FF2B5EF4-FFF2-40B4-BE49-F238E27FC236}">
+                <a16:creationId xmlns:a16="http://schemas.microsoft.com/office/drawing/2014/main" id="{5BBA9726-E15F-0A59-1501-F4EA2940FDE4}"/>
               </a:ext>
             </a:extLst>
           </p:cNvPr>
           <p:cNvPicPr>
-            <a:picLocks noChangeAspect="1" noChangeArrowheads="1"/>
+            <a:picLocks noGrp="1" noChangeAspect="1"/>
           </p:cNvPicPr>
-          <p:nvPr/>
+          <p:nvPr>
+            <p:ph idx="1"/>
+          </p:nvPr>
         </p:nvPicPr>
         <p:blipFill>
           <a:blip r:embed="rId2">
@@ -3866,496 +3918,20 @@
               </a:ext>
             </a:extLst>
           </a:blip>
-          <a:srcRect/>
           <a:stretch>
             <a:fillRect/>
           </a:stretch>
         </p:blipFill>
-        <p:spPr bwMode="auto">
+        <p:spPr>
           <a:xfrm>
-            <a:off x="3179356" y="2145906"/>
-            <a:ext cx="5400675" cy="3794125"/>
+            <a:off x="4328316" y="640080"/>
+            <a:ext cx="7106771" cy="5578816"/>
           </a:xfrm>
           <a:prstGeom prst="rect">
             <a:avLst/>
           </a:prstGeom>
-          <a:noFill/>
-          <a:extLst>
-            <a:ext uri="{909E8E84-426E-40DD-AFC4-6F175D3DCCD1}">
-              <a14:hiddenFill xmlns:a14="http://schemas.microsoft.com/office/drawing/2010/main">
-                <a:solidFill>
-                  <a:srgbClr val="FFFFFF"/>
-                </a:solidFill>
-              </a14:hiddenFill>
-            </a:ext>
-          </a:extLst>
         </p:spPr>
       </p:pic>
-      <p:sp>
-        <p:nvSpPr>
-          <p:cNvPr id="5" name="Cuadro de texto 2">
-            <a:extLst>
-              <a:ext uri="{FF2B5EF4-FFF2-40B4-BE49-F238E27FC236}">
-                <a16:creationId xmlns:a16="http://schemas.microsoft.com/office/drawing/2014/main" id="{3134115D-F9D0-B6BA-5A4E-B63A46E2E7AC}"/>
-              </a:ext>
-            </a:extLst>
-          </p:cNvPr>
-          <p:cNvSpPr txBox="1">
-            <a:spLocks noChangeArrowheads="1"/>
-          </p:cNvSpPr>
-          <p:nvPr/>
-        </p:nvSpPr>
-        <p:spPr bwMode="auto">
-          <a:xfrm>
-            <a:off x="5046941" y="2021943"/>
-            <a:ext cx="1200150" cy="673100"/>
-          </a:xfrm>
-          <a:prstGeom prst="rect">
-            <a:avLst/>
-          </a:prstGeom>
-          <a:noFill/>
-          <a:ln w="9525">
-            <a:solidFill>
-              <a:srgbClr val="7030A0"/>
-            </a:solidFill>
-            <a:miter lim="800000"/>
-            <a:headEnd/>
-            <a:tailEnd/>
-          </a:ln>
-          <a:extLst>
-            <a:ext uri="{909E8E84-426E-40DD-AFC4-6F175D3DCCD1}">
-              <a14:hiddenFill xmlns:a14="http://schemas.microsoft.com/office/drawing/2010/main">
-                <a:solidFill>
-                  <a:srgbClr val="FFFFFF"/>
-                </a:solidFill>
-              </a14:hiddenFill>
-            </a:ext>
-          </a:extLst>
-        </p:spPr>
-        <p:txBody>
-          <a:bodyPr vert="horz" wrap="square" lIns="91440" tIns="45720" rIns="91440" bIns="45720" numCol="1" anchor="t" anchorCtr="0" compatLnSpc="1">
-            <a:prstTxWarp prst="textNoShape">
-              <a:avLst/>
-            </a:prstTxWarp>
-          </a:bodyPr>
-          <a:lstStyle/>
-          <a:p>
-            <a:pPr marL="0" marR="0" lvl="0" indent="0" algn="l" defTabSz="914400" rtl="0" eaLnBrk="0" fontAlgn="base" latinLnBrk="0" hangingPunct="0">
-              <a:lnSpc>
-                <a:spcPct val="100000"/>
-              </a:lnSpc>
-              <a:spcBef>
-                <a:spcPct val="0"/>
-              </a:spcBef>
-              <a:spcAft>
-                <a:spcPct val="0"/>
-              </a:spcAft>
-              <a:buClrTx/>
-              <a:buSzTx/>
-              <a:buFontTx/>
-              <a:buNone/>
-              <a:tabLst/>
-            </a:pPr>
-            <a:r>
-              <a:rPr kumimoji="0" lang="es-MX" altLang="es-MX" sz="1100" b="0" i="0" u="none" strike="noStrike" cap="none" normalizeH="0" baseline="0">
-                <a:ln>
-                  <a:noFill/>
-                </a:ln>
-                <a:solidFill>
-                  <a:schemeClr val="tx1"/>
-                </a:solidFill>
-                <a:effectLst/>
-                <a:latin typeface="Calibri" panose="020F0502020204030204" pitchFamily="34" charset="0"/>
-                <a:ea typeface="Times New Roman" panose="02020603050405020304" pitchFamily="18" charset="0"/>
-                <a:cs typeface="Times New Roman" panose="02020603050405020304" pitchFamily="18" charset="0"/>
-              </a:rPr>
-              <a:t>Sección A</a:t>
-            </a:r>
-            <a:endParaRPr kumimoji="0" lang="es-MX" altLang="es-MX" sz="1800" b="0" i="0" u="none" strike="noStrike" cap="none" normalizeH="0" baseline="0">
-              <a:ln>
-                <a:noFill/>
-              </a:ln>
-              <a:solidFill>
-                <a:schemeClr val="tx1"/>
-              </a:solidFill>
-              <a:effectLst/>
-              <a:latin typeface="Arial" panose="020B0604020202020204" pitchFamily="34" charset="0"/>
-            </a:endParaRPr>
-          </a:p>
-        </p:txBody>
-      </p:sp>
-      <p:sp>
-        <p:nvSpPr>
-          <p:cNvPr id="6" name="Text Box 1">
-            <a:extLst>
-              <a:ext uri="{FF2B5EF4-FFF2-40B4-BE49-F238E27FC236}">
-                <a16:creationId xmlns:a16="http://schemas.microsoft.com/office/drawing/2014/main" id="{4C4A764C-2FDF-8B72-4A21-9B981CAA881E}"/>
-              </a:ext>
-            </a:extLst>
-          </p:cNvPr>
-          <p:cNvSpPr txBox="1">
-            <a:spLocks noChangeArrowheads="1"/>
-          </p:cNvSpPr>
-          <p:nvPr/>
-        </p:nvSpPr>
-        <p:spPr bwMode="auto">
-          <a:xfrm>
-            <a:off x="6415219" y="1912268"/>
-            <a:ext cx="2241550" cy="1524000"/>
-          </a:xfrm>
-          <a:prstGeom prst="rect">
-            <a:avLst/>
-          </a:prstGeom>
-          <a:noFill/>
-          <a:ln w="9525">
-            <a:solidFill>
-              <a:srgbClr val="7030A0"/>
-            </a:solidFill>
-            <a:miter lim="800000"/>
-            <a:headEnd/>
-            <a:tailEnd/>
-          </a:ln>
-          <a:extLst>
-            <a:ext uri="{909E8E84-426E-40DD-AFC4-6F175D3DCCD1}">
-              <a14:hiddenFill xmlns:a14="http://schemas.microsoft.com/office/drawing/2010/main">
-                <a:solidFill>
-                  <a:srgbClr val="FFFFFF"/>
-                </a:solidFill>
-              </a14:hiddenFill>
-            </a:ext>
-          </a:extLst>
-        </p:spPr>
-        <p:txBody>
-          <a:bodyPr vert="horz" wrap="square" lIns="91440" tIns="45720" rIns="91440" bIns="45720" numCol="1" anchor="t" anchorCtr="0" compatLnSpc="1">
-            <a:prstTxWarp prst="textNoShape">
-              <a:avLst/>
-            </a:prstTxWarp>
-          </a:bodyPr>
-          <a:lstStyle/>
-          <a:p>
-            <a:pPr marL="0" marR="0" lvl="0" indent="0" algn="l" defTabSz="914400" rtl="0" eaLnBrk="0" fontAlgn="base" latinLnBrk="0" hangingPunct="0">
-              <a:lnSpc>
-                <a:spcPct val="100000"/>
-              </a:lnSpc>
-              <a:spcBef>
-                <a:spcPct val="0"/>
-              </a:spcBef>
-              <a:spcAft>
-                <a:spcPct val="0"/>
-              </a:spcAft>
-              <a:buClrTx/>
-              <a:buSzTx/>
-              <a:buFontTx/>
-              <a:buNone/>
-              <a:tabLst/>
-            </a:pPr>
-            <a:r>
-              <a:rPr kumimoji="0" lang="es-MX" altLang="es-MX" sz="1100" b="0" i="0" u="none" strike="noStrike" cap="none" normalizeH="0" baseline="0">
-                <a:ln>
-                  <a:noFill/>
-                </a:ln>
-                <a:solidFill>
-                  <a:schemeClr val="tx1"/>
-                </a:solidFill>
-                <a:effectLst/>
-                <a:latin typeface="Calibri" panose="020F0502020204030204" pitchFamily="34" charset="0"/>
-                <a:ea typeface="Times New Roman" panose="02020603050405020304" pitchFamily="18" charset="0"/>
-                <a:cs typeface="Times New Roman" panose="02020603050405020304" pitchFamily="18" charset="0"/>
-              </a:rPr>
-              <a:t>Sección B</a:t>
-            </a:r>
-            <a:endParaRPr kumimoji="0" lang="es-MX" altLang="es-MX" sz="1800" b="0" i="0" u="none" strike="noStrike" cap="none" normalizeH="0" baseline="0">
-              <a:ln>
-                <a:noFill/>
-              </a:ln>
-              <a:solidFill>
-                <a:schemeClr val="tx1"/>
-              </a:solidFill>
-              <a:effectLst/>
-              <a:latin typeface="Arial" panose="020B0604020202020204" pitchFamily="34" charset="0"/>
-            </a:endParaRPr>
-          </a:p>
-        </p:txBody>
-      </p:sp>
-      <p:sp>
-        <p:nvSpPr>
-          <p:cNvPr id="7" name="Text Box 2">
-            <a:extLst>
-              <a:ext uri="{FF2B5EF4-FFF2-40B4-BE49-F238E27FC236}">
-                <a16:creationId xmlns:a16="http://schemas.microsoft.com/office/drawing/2014/main" id="{C4A7E1B5-9CB3-6F2E-933F-BE0B523DD13B}"/>
-              </a:ext>
-            </a:extLst>
-          </p:cNvPr>
-          <p:cNvSpPr txBox="1">
-            <a:spLocks noChangeArrowheads="1"/>
-          </p:cNvSpPr>
-          <p:nvPr/>
-        </p:nvSpPr>
-        <p:spPr bwMode="auto">
-          <a:xfrm>
-            <a:off x="3102618" y="2826151"/>
-            <a:ext cx="1651000" cy="901700"/>
-          </a:xfrm>
-          <a:prstGeom prst="rect">
-            <a:avLst/>
-          </a:prstGeom>
-          <a:noFill/>
-          <a:ln w="9525">
-            <a:solidFill>
-              <a:srgbClr val="7030A0"/>
-            </a:solidFill>
-            <a:miter lim="800000"/>
-            <a:headEnd/>
-            <a:tailEnd/>
-          </a:ln>
-          <a:extLst>
-            <a:ext uri="{909E8E84-426E-40DD-AFC4-6F175D3DCCD1}">
-              <a14:hiddenFill xmlns:a14="http://schemas.microsoft.com/office/drawing/2010/main">
-                <a:solidFill>
-                  <a:srgbClr val="FFFFFF"/>
-                </a:solidFill>
-              </a14:hiddenFill>
-            </a:ext>
-          </a:extLst>
-        </p:spPr>
-        <p:txBody>
-          <a:bodyPr vert="horz" wrap="square" lIns="91440" tIns="45720" rIns="91440" bIns="45720" numCol="1" anchor="t" anchorCtr="0" compatLnSpc="1">
-            <a:prstTxWarp prst="textNoShape">
-              <a:avLst/>
-            </a:prstTxWarp>
-          </a:bodyPr>
-          <a:lstStyle/>
-          <a:p>
-            <a:pPr marL="0" marR="0" lvl="0" indent="0" algn="l" defTabSz="914400" rtl="0" eaLnBrk="0" fontAlgn="base" latinLnBrk="0" hangingPunct="0">
-              <a:lnSpc>
-                <a:spcPct val="100000"/>
-              </a:lnSpc>
-              <a:spcBef>
-                <a:spcPct val="0"/>
-              </a:spcBef>
-              <a:spcAft>
-                <a:spcPct val="0"/>
-              </a:spcAft>
-              <a:buClrTx/>
-              <a:buSzTx/>
-              <a:buFontTx/>
-              <a:buNone/>
-              <a:tabLst/>
-            </a:pPr>
-            <a:r>
-              <a:rPr kumimoji="0" lang="es-MX" altLang="es-MX" sz="1100" b="0" i="0" u="none" strike="noStrike" cap="none" normalizeH="0" baseline="0">
-                <a:ln>
-                  <a:noFill/>
-                </a:ln>
-                <a:solidFill>
-                  <a:schemeClr val="tx1"/>
-                </a:solidFill>
-                <a:effectLst/>
-                <a:latin typeface="Calibri" panose="020F0502020204030204" pitchFamily="34" charset="0"/>
-                <a:ea typeface="Times New Roman" panose="02020603050405020304" pitchFamily="18" charset="0"/>
-                <a:cs typeface="Times New Roman" panose="02020603050405020304" pitchFamily="18" charset="0"/>
-              </a:rPr>
-              <a:t>Sección E</a:t>
-            </a:r>
-            <a:endParaRPr kumimoji="0" lang="es-MX" altLang="es-MX" sz="1800" b="0" i="0" u="none" strike="noStrike" cap="none" normalizeH="0" baseline="0">
-              <a:ln>
-                <a:noFill/>
-              </a:ln>
-              <a:solidFill>
-                <a:schemeClr val="tx1"/>
-              </a:solidFill>
-              <a:effectLst/>
-              <a:latin typeface="Arial" panose="020B0604020202020204" pitchFamily="34" charset="0"/>
-            </a:endParaRPr>
-          </a:p>
-        </p:txBody>
-      </p:sp>
-      <p:sp>
-        <p:nvSpPr>
-          <p:cNvPr id="8" name="Text Box 3">
-            <a:extLst>
-              <a:ext uri="{FF2B5EF4-FFF2-40B4-BE49-F238E27FC236}">
-                <a16:creationId xmlns:a16="http://schemas.microsoft.com/office/drawing/2014/main" id="{B6CB7B63-15E8-A7EA-1322-68180C558D15}"/>
-              </a:ext>
-            </a:extLst>
-          </p:cNvPr>
-          <p:cNvSpPr txBox="1">
-            <a:spLocks noChangeArrowheads="1"/>
-          </p:cNvSpPr>
-          <p:nvPr/>
-        </p:nvSpPr>
-        <p:spPr bwMode="auto">
-          <a:xfrm>
-            <a:off x="3062479" y="4472390"/>
-            <a:ext cx="2209800" cy="990600"/>
-          </a:xfrm>
-          <a:prstGeom prst="rect">
-            <a:avLst/>
-          </a:prstGeom>
-          <a:noFill/>
-          <a:ln w="9525">
-            <a:solidFill>
-              <a:srgbClr val="7030A0"/>
-            </a:solidFill>
-            <a:miter lim="800000"/>
-            <a:headEnd/>
-            <a:tailEnd/>
-          </a:ln>
-          <a:extLst>
-            <a:ext uri="{909E8E84-426E-40DD-AFC4-6F175D3DCCD1}">
-              <a14:hiddenFill xmlns:a14="http://schemas.microsoft.com/office/drawing/2010/main">
-                <a:solidFill>
-                  <a:srgbClr val="FFFFFF"/>
-                </a:solidFill>
-              </a14:hiddenFill>
-            </a:ext>
-          </a:extLst>
-        </p:spPr>
-        <p:txBody>
-          <a:bodyPr vert="horz" wrap="square" lIns="91440" tIns="45720" rIns="91440" bIns="45720" numCol="1" anchor="t" anchorCtr="0" compatLnSpc="1">
-            <a:prstTxWarp prst="textNoShape">
-              <a:avLst/>
-            </a:prstTxWarp>
-          </a:bodyPr>
-          <a:lstStyle/>
-          <a:p>
-            <a:pPr marL="0" marR="0" lvl="0" indent="0" algn="l" defTabSz="914400" rtl="0" eaLnBrk="0" fontAlgn="base" latinLnBrk="0" hangingPunct="0">
-              <a:lnSpc>
-                <a:spcPct val="100000"/>
-              </a:lnSpc>
-              <a:spcBef>
-                <a:spcPct val="0"/>
-              </a:spcBef>
-              <a:spcAft>
-                <a:spcPct val="0"/>
-              </a:spcAft>
-              <a:buClrTx/>
-              <a:buSzTx/>
-              <a:buFontTx/>
-              <a:buNone/>
-              <a:tabLst/>
-            </a:pPr>
-            <a:r>
-              <a:rPr kumimoji="0" lang="es-MX" altLang="es-MX" sz="1100" b="0" i="0" u="none" strike="noStrike" cap="none" normalizeH="0" baseline="0">
-                <a:ln>
-                  <a:noFill/>
-                </a:ln>
-                <a:solidFill>
-                  <a:schemeClr val="tx1"/>
-                </a:solidFill>
-                <a:effectLst/>
-                <a:latin typeface="Calibri" panose="020F0502020204030204" pitchFamily="34" charset="0"/>
-                <a:ea typeface="Times New Roman" panose="02020603050405020304" pitchFamily="18" charset="0"/>
-                <a:cs typeface="Times New Roman" panose="02020603050405020304" pitchFamily="18" charset="0"/>
-              </a:rPr>
-              <a:t>Sección D</a:t>
-            </a:r>
-            <a:endParaRPr kumimoji="0" lang="es-MX" altLang="es-MX" sz="1800" b="0" i="0" u="none" strike="noStrike" cap="none" normalizeH="0" baseline="0">
-              <a:ln>
-                <a:noFill/>
-              </a:ln>
-              <a:solidFill>
-                <a:schemeClr val="tx1"/>
-              </a:solidFill>
-              <a:effectLst/>
-              <a:latin typeface="Arial" panose="020B0604020202020204" pitchFamily="34" charset="0"/>
-            </a:endParaRPr>
-          </a:p>
-        </p:txBody>
-      </p:sp>
-      <p:sp>
-        <p:nvSpPr>
-          <p:cNvPr id="9" name="Text Box 6">
-            <a:extLst>
-              <a:ext uri="{FF2B5EF4-FFF2-40B4-BE49-F238E27FC236}">
-                <a16:creationId xmlns:a16="http://schemas.microsoft.com/office/drawing/2014/main" id="{CC4693BD-F608-2BD9-6B5F-A2CF78BA9D71}"/>
-              </a:ext>
-            </a:extLst>
-          </p:cNvPr>
-          <p:cNvSpPr txBox="1">
-            <a:spLocks noChangeArrowheads="1"/>
-          </p:cNvSpPr>
-          <p:nvPr/>
-        </p:nvSpPr>
-        <p:spPr bwMode="auto">
-          <a:xfrm>
-            <a:off x="6415219" y="3727851"/>
-            <a:ext cx="2228850" cy="2311400"/>
-          </a:xfrm>
-          <a:prstGeom prst="rect">
-            <a:avLst/>
-          </a:prstGeom>
-          <a:noFill/>
-          <a:ln w="9525">
-            <a:solidFill>
-              <a:srgbClr val="7030A0"/>
-            </a:solidFill>
-            <a:miter lim="800000"/>
-            <a:headEnd/>
-            <a:tailEnd/>
-          </a:ln>
-          <a:extLst>
-            <a:ext uri="{909E8E84-426E-40DD-AFC4-6F175D3DCCD1}">
-              <a14:hiddenFill xmlns:a14="http://schemas.microsoft.com/office/drawing/2010/main">
-                <a:solidFill>
-                  <a:srgbClr val="FFFFFF"/>
-                </a:solidFill>
-              </a14:hiddenFill>
-            </a:ext>
-          </a:extLst>
-        </p:spPr>
-        <p:txBody>
-          <a:bodyPr vert="horz" wrap="square" lIns="91440" tIns="45720" rIns="91440" bIns="45720" numCol="1" anchor="t" anchorCtr="0" compatLnSpc="1">
-            <a:prstTxWarp prst="textNoShape">
-              <a:avLst/>
-            </a:prstTxWarp>
-          </a:bodyPr>
-          <a:lstStyle/>
-          <a:p>
-            <a:pPr marL="0" marR="0" lvl="0" indent="0" algn="l" defTabSz="914400" rtl="0" eaLnBrk="0" fontAlgn="base" latinLnBrk="0" hangingPunct="0">
-              <a:lnSpc>
-                <a:spcPct val="100000"/>
-              </a:lnSpc>
-              <a:spcBef>
-                <a:spcPct val="0"/>
-              </a:spcBef>
-              <a:spcAft>
-                <a:spcPct val="0"/>
-              </a:spcAft>
-              <a:buClrTx/>
-              <a:buSzTx/>
-              <a:buFontTx/>
-              <a:buNone/>
-              <a:tabLst/>
-            </a:pPr>
-            <a:r>
-              <a:rPr kumimoji="0" lang="es-MX" altLang="es-MX" sz="1100" b="0" i="0" u="none" strike="noStrike" cap="none" normalizeH="0" baseline="0">
-                <a:ln>
-                  <a:noFill/>
-                </a:ln>
-                <a:solidFill>
-                  <a:schemeClr val="tx1"/>
-                </a:solidFill>
-                <a:effectLst/>
-                <a:latin typeface="Calibri" panose="020F0502020204030204" pitchFamily="34" charset="0"/>
-                <a:ea typeface="Times New Roman" panose="02020603050405020304" pitchFamily="18" charset="0"/>
-                <a:cs typeface="Times New Roman" panose="02020603050405020304" pitchFamily="18" charset="0"/>
-              </a:rPr>
-              <a:t>        Sección C</a:t>
-            </a:r>
-            <a:endParaRPr kumimoji="0" lang="es-MX" altLang="es-MX" sz="1800" b="0" i="0" u="none" strike="noStrike" cap="none" normalizeH="0" baseline="0">
-              <a:ln>
-                <a:noFill/>
-              </a:ln>
-              <a:solidFill>
-                <a:schemeClr val="tx1"/>
-              </a:solidFill>
-              <a:effectLst/>
-              <a:latin typeface="Arial" panose="020B0604020202020204" pitchFamily="34" charset="0"/>
-            </a:endParaRPr>
-          </a:p>
-        </p:txBody>
-      </p:sp>
     </p:spTree>
     <p:extLst>
       <p:ext uri="{BB962C8B-B14F-4D97-AF65-F5344CB8AC3E}">

</xml_diff>